<commit_message>
Add builds for the hardware support slides
</commit_message>
<xml_diff>
--- a/undergraduate/lectures/security.pptx
+++ b/undergraduate/lectures/security.pptx
@@ -7216,7 +7216,11 @@
           <a:p>
             <a:r>
               <a:rPr lang="en-US" dirty="0" smtClean="0"/>
-              <a:t>Something you are</a:t>
+              <a:t>Something </a:t>
+            </a:r>
+            <a:r>
+              <a:rPr lang="en-US" dirty="0" smtClean="0"/>
+              <a:t>you are</a:t>
             </a:r>
           </a:p>
           <a:p>
@@ -7225,7 +7229,6 @@
               <a:rPr lang="en-US" dirty="0" smtClean="0"/>
               <a:t>Fingerprint</a:t>
             </a:r>
-            <a:endParaRPr lang="en-US" dirty="0"/>
           </a:p>
         </p:txBody>
       </p:sp>
@@ -8811,7 +8814,22 @@
           <a:bodyPr/>
           <a:lstStyle/>
           <a:p>
-            <a:endParaRPr lang="en-US"/>
+            <a:r>
+              <a:rPr lang="en-US" dirty="0" smtClean="0"/>
+              <a:t>Alice cannot interfere with Bob</a:t>
+            </a:r>
+          </a:p>
+          <a:p>
+            <a:r>
+              <a:rPr lang="en-US" dirty="0" smtClean="0"/>
+              <a:t>Alice cannot communicate with Bob without prior agreement</a:t>
+            </a:r>
+          </a:p>
+          <a:p>
+            <a:r>
+              <a:rPr lang="en-US" dirty="0" smtClean="0"/>
+              <a:t>Eve cannot read data contained in Alice or Bob</a:t>
+            </a:r>
           </a:p>
         </p:txBody>
       </p:sp>
@@ -8913,7 +8931,73 @@
           <a:bodyPr/>
           <a:lstStyle/>
           <a:p>
-            <a:endParaRPr lang="en-US"/>
+            <a:r>
+              <a:rPr lang="en-US" dirty="0" smtClean="0"/>
+              <a:t>An entity must prove they have the right to a resource</a:t>
+            </a:r>
+          </a:p>
+          <a:p>
+            <a:pPr lvl="1"/>
+            <a:r>
+              <a:rPr lang="en-US" dirty="0" smtClean="0"/>
+              <a:t>File</a:t>
+            </a:r>
+          </a:p>
+          <a:p>
+            <a:pPr lvl="1"/>
+            <a:r>
+              <a:rPr lang="en-US" dirty="0" smtClean="0"/>
+              <a:t>Memory</a:t>
+            </a:r>
+          </a:p>
+          <a:p>
+            <a:pPr lvl="1"/>
+            <a:r>
+              <a:rPr lang="en-US" dirty="0" smtClean="0"/>
+              <a:t>CPU</a:t>
+            </a:r>
+          </a:p>
+          <a:p>
+            <a:pPr lvl="1"/>
+            <a:r>
+              <a:rPr lang="en-US" dirty="0" smtClean="0"/>
+              <a:t>Another process</a:t>
+            </a:r>
+          </a:p>
+          <a:p>
+            <a:pPr lvl="1"/>
+            <a:r>
+              <a:rPr lang="en-US" dirty="0" smtClean="0"/>
+              <a:t>The system as a whole</a:t>
+            </a:r>
+            <a:endParaRPr lang="en-US" dirty="0"/>
+          </a:p>
+          <a:p>
+            <a:r>
+              <a:rPr lang="en-US" dirty="0" smtClean="0"/>
+              <a:t>Entities include</a:t>
+            </a:r>
+          </a:p>
+          <a:p>
+            <a:pPr lvl="1"/>
+            <a:r>
+              <a:rPr lang="en-US" dirty="0" smtClean="0"/>
+              <a:t>Humans</a:t>
+            </a:r>
+          </a:p>
+          <a:p>
+            <a:pPr lvl="1"/>
+            <a:r>
+              <a:rPr lang="en-US" dirty="0" smtClean="0"/>
+              <a:t>Programs</a:t>
+            </a:r>
+          </a:p>
+          <a:p>
+            <a:pPr lvl="1"/>
+            <a:r>
+              <a:rPr lang="en-US" dirty="0" smtClean="0"/>
+              <a:t>Other computers</a:t>
+            </a:r>
           </a:p>
         </p:txBody>
       </p:sp>
@@ -8994,7 +9078,7 @@
           <a:p>
             <a:r>
               <a:rPr lang="en-US" dirty="0" smtClean="0"/>
-              <a:t>Trust</a:t>
+              <a:t>Building Trust</a:t>
             </a:r>
             <a:endParaRPr lang="en-US" dirty="0"/>
           </a:p>
@@ -9014,6 +9098,18 @@
         <p:txBody>
           <a:bodyPr/>
           <a:lstStyle/>
+          <a:p>
+            <a:r>
+              <a:rPr lang="en-US" dirty="0" smtClean="0"/>
+              <a:t>Testing</a:t>
+            </a:r>
+          </a:p>
+          <a:p>
+            <a:r>
+              <a:rPr lang="en-US" smtClean="0"/>
+              <a:t>Formal Proofs</a:t>
+            </a:r>
+          </a:p>
           <a:p>
             <a:endParaRPr lang="en-US" dirty="0"/>
           </a:p>

</xml_diff>

<commit_message>
Update the kernel services and security lectures.
</commit_message>
<xml_diff>
--- a/undergraduate/lectures/security.pptx
+++ b/undergraduate/lectures/security.pptx
@@ -5,7 +5,7 @@
     <p:sldMasterId id="2147483786" r:id="rId1"/>
   </p:sldMasterIdLst>
   <p:notesMasterIdLst>
-    <p:notesMasterId r:id="rId27"/>
+    <p:notesMasterId r:id="rId29"/>
   </p:notesMasterIdLst>
   <p:sldIdLst>
     <p:sldId id="256" r:id="rId2"/>
@@ -33,6 +33,8 @@
     <p:sldId id="273" r:id="rId24"/>
     <p:sldId id="272" r:id="rId25"/>
     <p:sldId id="271" r:id="rId26"/>
+    <p:sldId id="281" r:id="rId27"/>
+    <p:sldId id="282" r:id="rId28"/>
   </p:sldIdLst>
   <p:sldSz cx="12192000" cy="6858000"/>
   <p:notesSz cx="6858000" cy="9144000"/>
@@ -8712,7 +8714,57 @@
           <a:bodyPr/>
           <a:lstStyle/>
           <a:p>
-            <a:endParaRPr lang="en-US"/>
+            <a:r>
+              <a:rPr lang="en-US" dirty="0" smtClean="0"/>
+              <a:t>Sometimes you need more effective power</a:t>
+            </a:r>
+          </a:p>
+          <a:p>
+            <a:r>
+              <a:rPr lang="en-US" dirty="0" smtClean="0"/>
+              <a:t>Effective UID vs. Real UID</a:t>
+            </a:r>
+          </a:p>
+          <a:p>
+            <a:r>
+              <a:rPr lang="en-US" dirty="0" err="1" smtClean="0"/>
+              <a:t>getuid</a:t>
+            </a:r>
+            <a:r>
+              <a:rPr lang="en-US" dirty="0" smtClean="0"/>
+              <a:t>(2)</a:t>
+            </a:r>
+          </a:p>
+          <a:p>
+            <a:r>
+              <a:rPr lang="en-US" dirty="0" err="1" smtClean="0"/>
+              <a:t>geteuid</a:t>
+            </a:r>
+            <a:r>
+              <a:rPr lang="en-US" dirty="0" smtClean="0"/>
+              <a:t>(2)</a:t>
+            </a:r>
+          </a:p>
+          <a:p>
+            <a:r>
+              <a:rPr lang="en-US" dirty="0" err="1" smtClean="0"/>
+              <a:t>setuid</a:t>
+            </a:r>
+            <a:r>
+              <a:rPr lang="en-US" dirty="0" smtClean="0"/>
+              <a:t>(2)</a:t>
+            </a:r>
+          </a:p>
+          <a:p>
+            <a:r>
+              <a:rPr lang="en-US" dirty="0" err="1" smtClean="0"/>
+              <a:t>seteuid</a:t>
+            </a:r>
+            <a:r>
+              <a:rPr lang="en-US" dirty="0" smtClean="0"/>
+              <a:t>(2)</a:t>
+            </a:r>
+            <a:endParaRPr lang="en-US" dirty="0"/>
           </a:p>
         </p:txBody>
       </p:sp>
@@ -8743,6 +8795,312 @@
     <p:extLst>
       <p:ext uri="{BB962C8B-B14F-4D97-AF65-F5344CB8AC3E}">
         <p14:creationId xmlns:p14="http://schemas.microsoft.com/office/powerpoint/2010/main" val="832101954"/>
+      </p:ext>
+    </p:extLst>
+  </p:cSld>
+  <p:clrMapOvr>
+    <a:masterClrMapping/>
+  </p:clrMapOvr>
+  <p:timing>
+    <p:tnLst>
+      <p:par>
+        <p:cTn id="1" dur="indefinite" restart="never" nodeType="tmRoot"/>
+      </p:par>
+    </p:tnLst>
+  </p:timing>
+</p:sld>
+</file>
+
+<file path=ppt/slides/slide26.xml><?xml version="1.0" encoding="utf-8"?>
+<p:sld xmlns:a="http://schemas.openxmlformats.org/drawingml/2006/main" xmlns:r="http://schemas.openxmlformats.org/officeDocument/2006/relationships" xmlns:p="http://schemas.openxmlformats.org/presentationml/2006/main">
+  <p:cSld>
+    <p:spTree>
+      <p:nvGrpSpPr>
+        <p:cNvPr id="1" name=""/>
+        <p:cNvGrpSpPr/>
+        <p:nvPr/>
+      </p:nvGrpSpPr>
+      <p:grpSpPr>
+        <a:xfrm>
+          <a:off x="0" y="0"/>
+          <a:ext cx="0" cy="0"/>
+          <a:chOff x="0" y="0"/>
+          <a:chExt cx="0" cy="0"/>
+        </a:xfrm>
+      </p:grpSpPr>
+      <p:sp>
+        <p:nvSpPr>
+          <p:cNvPr id="2" name="Title 1"/>
+          <p:cNvSpPr>
+            <a:spLocks noGrp="1"/>
+          </p:cNvSpPr>
+          <p:nvPr>
+            <p:ph type="title"/>
+          </p:nvPr>
+        </p:nvSpPr>
+        <p:spPr/>
+        <p:txBody>
+          <a:bodyPr/>
+          <a:lstStyle/>
+          <a:p>
+            <a:r>
+              <a:rPr lang="en-US" dirty="0" smtClean="0"/>
+              <a:t>Escalating Privileges</a:t>
+            </a:r>
+            <a:endParaRPr lang="en-US" dirty="0"/>
+          </a:p>
+        </p:txBody>
+      </p:sp>
+      <p:pic>
+        <p:nvPicPr>
+          <p:cNvPr id="5" name="Content Placeholder 4"/>
+          <p:cNvPicPr>
+            <a:picLocks noGrp="1" noChangeAspect="1"/>
+          </p:cNvPicPr>
+          <p:nvPr>
+            <p:ph idx="1"/>
+          </p:nvPr>
+        </p:nvPicPr>
+        <p:blipFill>
+          <a:blip r:embed="rId2"/>
+          <a:stretch>
+            <a:fillRect/>
+          </a:stretch>
+        </p:blipFill>
+        <p:spPr>
+          <a:xfrm>
+            <a:off x="3840163" y="1827213"/>
+            <a:ext cx="4572000" cy="3797300"/>
+          </a:xfrm>
+        </p:spPr>
+      </p:pic>
+      <p:sp>
+        <p:nvSpPr>
+          <p:cNvPr id="4" name="Footer Placeholder 3"/>
+          <p:cNvSpPr>
+            <a:spLocks noGrp="1"/>
+          </p:cNvSpPr>
+          <p:nvPr>
+            <p:ph type="ftr" sz="quarter" idx="11"/>
+          </p:nvPr>
+        </p:nvSpPr>
+        <p:spPr/>
+        <p:txBody>
+          <a:bodyPr/>
+          <a:lstStyle/>
+          <a:p>
+            <a:r>
+              <a:rPr lang="en-US" smtClean="0"/>
+              <a:t>Introduction to Operating Systems</a:t>
+            </a:r>
+            <a:endParaRPr lang="en-US" dirty="0"/>
+          </a:p>
+        </p:txBody>
+      </p:sp>
+      <p:sp>
+        <p:nvSpPr>
+          <p:cNvPr id="6" name="TextBox 5"/>
+          <p:cNvSpPr txBox="1"/>
+          <p:nvPr/>
+        </p:nvSpPr>
+        <p:spPr>
+          <a:xfrm>
+            <a:off x="5019930" y="5672817"/>
+            <a:ext cx="2212465" cy="369332"/>
+          </a:xfrm>
+          <a:prstGeom prst="rect">
+            <a:avLst/>
+          </a:prstGeom>
+          <a:noFill/>
+        </p:spPr>
+        <p:txBody>
+          <a:bodyPr wrap="none" rtlCol="0">
+            <a:spAutoFit/>
+          </a:bodyPr>
+          <a:lstStyle/>
+          <a:p>
+            <a:r>
+              <a:rPr lang="en-US" dirty="0"/>
+              <a:t>https://</a:t>
+            </a:r>
+            <a:r>
+              <a:rPr lang="en-US" dirty="0" err="1"/>
+              <a:t>xkcd.com</a:t>
+            </a:r>
+            <a:r>
+              <a:rPr lang="en-US" dirty="0"/>
+              <a:t>/149/</a:t>
+            </a:r>
+            <a:endParaRPr lang="en-US" dirty="0"/>
+          </a:p>
+        </p:txBody>
+      </p:sp>
+    </p:spTree>
+    <p:extLst>
+      <p:ext uri="{BB962C8B-B14F-4D97-AF65-F5344CB8AC3E}">
+        <p14:creationId xmlns:p14="http://schemas.microsoft.com/office/powerpoint/2010/main" val="778839730"/>
+      </p:ext>
+    </p:extLst>
+  </p:cSld>
+  <p:clrMapOvr>
+    <a:masterClrMapping/>
+  </p:clrMapOvr>
+  <p:timing>
+    <p:tnLst>
+      <p:par>
+        <p:cTn id="1" dur="indefinite" restart="never" nodeType="tmRoot"/>
+      </p:par>
+    </p:tnLst>
+  </p:timing>
+</p:sld>
+</file>
+
+<file path=ppt/slides/slide27.xml><?xml version="1.0" encoding="utf-8"?>
+<p:sld xmlns:a="http://schemas.openxmlformats.org/drawingml/2006/main" xmlns:r="http://schemas.openxmlformats.org/officeDocument/2006/relationships" xmlns:p="http://schemas.openxmlformats.org/presentationml/2006/main">
+  <p:cSld>
+    <p:spTree>
+      <p:nvGrpSpPr>
+        <p:cNvPr id="1" name=""/>
+        <p:cNvGrpSpPr/>
+        <p:nvPr/>
+      </p:nvGrpSpPr>
+      <p:grpSpPr>
+        <a:xfrm>
+          <a:off x="0" y="0"/>
+          <a:ext cx="0" cy="0"/>
+          <a:chOff x="0" y="0"/>
+          <a:chExt cx="0" cy="0"/>
+        </a:xfrm>
+      </p:grpSpPr>
+      <p:sp>
+        <p:nvSpPr>
+          <p:cNvPr id="2" name="Title 1"/>
+          <p:cNvSpPr>
+            <a:spLocks noGrp="1"/>
+          </p:cNvSpPr>
+          <p:nvPr>
+            <p:ph type="title"/>
+          </p:nvPr>
+        </p:nvSpPr>
+        <p:spPr/>
+        <p:txBody>
+          <a:bodyPr/>
+          <a:lstStyle/>
+          <a:p>
+            <a:r>
+              <a:rPr lang="en-US" dirty="0" err="1" smtClean="0"/>
+              <a:t>sudo</a:t>
+            </a:r>
+            <a:r>
+              <a:rPr lang="en-US" dirty="0" smtClean="0"/>
+              <a:t> and privilege escalation</a:t>
+            </a:r>
+            <a:endParaRPr lang="en-US" dirty="0"/>
+          </a:p>
+        </p:txBody>
+      </p:sp>
+      <p:sp>
+        <p:nvSpPr>
+          <p:cNvPr id="3" name="Content Placeholder 2"/>
+          <p:cNvSpPr>
+            <a:spLocks noGrp="1"/>
+          </p:cNvSpPr>
+          <p:nvPr>
+            <p:ph idx="1"/>
+          </p:nvPr>
+        </p:nvSpPr>
+        <p:spPr/>
+        <p:txBody>
+          <a:bodyPr/>
+          <a:lstStyle/>
+          <a:p>
+            <a:r>
+              <a:rPr lang="en-US" dirty="0"/>
+              <a:t>-</a:t>
+            </a:r>
+            <a:r>
+              <a:rPr lang="en-US" dirty="0" err="1"/>
+              <a:t>rw</a:t>
+            </a:r>
+            <a:r>
+              <a:rPr lang="en-US" dirty="0" err="1">
+                <a:solidFill>
+                  <a:srgbClr val="FF0000"/>
+                </a:solidFill>
+              </a:rPr>
+              <a:t>s</a:t>
+            </a:r>
+            <a:r>
+              <a:rPr lang="en-US" dirty="0" err="1"/>
+              <a:t>r</a:t>
+            </a:r>
+            <a:r>
+              <a:rPr lang="en-US" dirty="0"/>
+              <a:t>-</a:t>
+            </a:r>
+            <a:r>
+              <a:rPr lang="en-US" dirty="0" err="1"/>
+              <a:t>xr</a:t>
+            </a:r>
+            <a:r>
+              <a:rPr lang="en-US" dirty="0"/>
+              <a:t>-x  1 root  wheel  112400 Feb  8 20:55 /</a:t>
+            </a:r>
+            <a:r>
+              <a:rPr lang="en-US" dirty="0" err="1"/>
+              <a:t>usr</a:t>
+            </a:r>
+            <a:r>
+              <a:rPr lang="en-US" dirty="0"/>
+              <a:t>/local/bin/</a:t>
+            </a:r>
+            <a:r>
+              <a:rPr lang="en-US" dirty="0" err="1"/>
+              <a:t>sudo</a:t>
+            </a:r>
+            <a:r>
+              <a:rPr lang="en-US" dirty="0" smtClean="0"/>
+              <a:t>*</a:t>
+            </a:r>
+          </a:p>
+          <a:p>
+            <a:r>
+              <a:rPr lang="en-US" dirty="0" smtClean="0"/>
+              <a:t>What does the “s” mean?</a:t>
+            </a:r>
+          </a:p>
+          <a:p>
+            <a:endParaRPr lang="en-US" dirty="0"/>
+          </a:p>
+        </p:txBody>
+      </p:sp>
+      <p:sp>
+        <p:nvSpPr>
+          <p:cNvPr id="4" name="Footer Placeholder 3"/>
+          <p:cNvSpPr>
+            <a:spLocks noGrp="1"/>
+          </p:cNvSpPr>
+          <p:nvPr>
+            <p:ph type="ftr" sz="quarter" idx="11"/>
+          </p:nvPr>
+        </p:nvSpPr>
+        <p:spPr/>
+        <p:txBody>
+          <a:bodyPr/>
+          <a:lstStyle/>
+          <a:p>
+            <a:r>
+              <a:rPr lang="en-US" smtClean="0"/>
+              <a:t>Introduction to Operating Systems</a:t>
+            </a:r>
+            <a:endParaRPr lang="en-US" dirty="0"/>
+          </a:p>
+        </p:txBody>
+      </p:sp>
+    </p:spTree>
+    <p:extLst>
+      <p:ext uri="{BB962C8B-B14F-4D97-AF65-F5344CB8AC3E}">
+        <p14:creationId xmlns:p14="http://schemas.microsoft.com/office/powerpoint/2010/main" val="1860185539"/>
       </p:ext>
     </p:extLst>
   </p:cSld>
@@ -9106,7 +9464,7 @@
           </a:p>
           <a:p>
             <a:r>
-              <a:rPr lang="en-US" smtClean="0"/>
+              <a:rPr lang="en-US" dirty="0" smtClean="0"/>
               <a:t>Formal Proofs</a:t>
             </a:r>
           </a:p>
@@ -9597,10 +9955,10 @@
           <a:p>
             <a:pPr algn="ctr"/>
             <a:r>
-              <a:rPr lang="en-US" smtClean="0"/>
+              <a:rPr lang="en-US" dirty="0" smtClean="0"/>
               <a:t>Ring 0</a:t>
             </a:r>
-            <a:endParaRPr lang="en-US"/>
+            <a:endParaRPr lang="en-US" dirty="0"/>
           </a:p>
         </p:txBody>
       </p:sp>
@@ -9721,9 +10079,402 @@
   <p:timing>
     <p:tnLst>
       <p:par>
-        <p:cTn id="1" dur="indefinite" restart="never" nodeType="tmRoot"/>
+        <p:cTn id="1" dur="indefinite" restart="never" nodeType="tmRoot">
+          <p:childTnLst>
+            <p:seq concurrent="1" nextAc="seek">
+              <p:cTn id="2" dur="indefinite" nodeType="mainSeq">
+                <p:childTnLst>
+                  <p:par>
+                    <p:cTn id="3" fill="hold">
+                      <p:stCondLst>
+                        <p:cond delay="indefinite"/>
+                      </p:stCondLst>
+                      <p:childTnLst>
+                        <p:par>
+                          <p:cTn id="4" fill="hold">
+                            <p:stCondLst>
+                              <p:cond delay="0"/>
+                            </p:stCondLst>
+                            <p:childTnLst>
+                              <p:par>
+                                <p:cTn id="5" presetID="1" presetClass="entr" presetSubtype="0" fill="hold" grpId="0" nodeType="clickEffect">
+                                  <p:stCondLst>
+                                    <p:cond delay="0"/>
+                                  </p:stCondLst>
+                                  <p:childTnLst>
+                                    <p:set>
+                                      <p:cBhvr>
+                                        <p:cTn id="6" dur="1" fill="hold">
+                                          <p:stCondLst>
+                                            <p:cond delay="0"/>
+                                          </p:stCondLst>
+                                        </p:cTn>
+                                        <p:tgtEl>
+                                          <p:spTgt spid="9"/>
+                                        </p:tgtEl>
+                                        <p:attrNameLst>
+                                          <p:attrName>style.visibility</p:attrName>
+                                        </p:attrNameLst>
+                                      </p:cBhvr>
+                                      <p:to>
+                                        <p:strVal val="visible"/>
+                                      </p:to>
+                                    </p:set>
+                                  </p:childTnLst>
+                                </p:cTn>
+                              </p:par>
+                            </p:childTnLst>
+                          </p:cTn>
+                        </p:par>
+                      </p:childTnLst>
+                    </p:cTn>
+                  </p:par>
+                  <p:par>
+                    <p:cTn id="7" fill="hold">
+                      <p:stCondLst>
+                        <p:cond delay="indefinite"/>
+                      </p:stCondLst>
+                      <p:childTnLst>
+                        <p:par>
+                          <p:cTn id="8" fill="hold">
+                            <p:stCondLst>
+                              <p:cond delay="0"/>
+                            </p:stCondLst>
+                            <p:childTnLst>
+                              <p:par>
+                                <p:cTn id="9" presetID="1" presetClass="entr" presetSubtype="0" fill="hold" grpId="0" nodeType="clickEffect">
+                                  <p:stCondLst>
+                                    <p:cond delay="0"/>
+                                  </p:stCondLst>
+                                  <p:childTnLst>
+                                    <p:set>
+                                      <p:cBhvr>
+                                        <p:cTn id="10" dur="1" fill="hold">
+                                          <p:stCondLst>
+                                            <p:cond delay="0"/>
+                                          </p:stCondLst>
+                                        </p:cTn>
+                                        <p:tgtEl>
+                                          <p:spTgt spid="8"/>
+                                        </p:tgtEl>
+                                        <p:attrNameLst>
+                                          <p:attrName>style.visibility</p:attrName>
+                                        </p:attrNameLst>
+                                      </p:cBhvr>
+                                      <p:to>
+                                        <p:strVal val="visible"/>
+                                      </p:to>
+                                    </p:set>
+                                  </p:childTnLst>
+                                </p:cTn>
+                              </p:par>
+                            </p:childTnLst>
+                          </p:cTn>
+                        </p:par>
+                      </p:childTnLst>
+                    </p:cTn>
+                  </p:par>
+                  <p:par>
+                    <p:cTn id="11" fill="hold">
+                      <p:stCondLst>
+                        <p:cond delay="indefinite"/>
+                      </p:stCondLst>
+                      <p:childTnLst>
+                        <p:par>
+                          <p:cTn id="12" fill="hold">
+                            <p:stCondLst>
+                              <p:cond delay="0"/>
+                            </p:stCondLst>
+                            <p:childTnLst>
+                              <p:par>
+                                <p:cTn id="13" presetID="1" presetClass="entr" presetSubtype="0" fill="hold" grpId="0" nodeType="clickEffect">
+                                  <p:stCondLst>
+                                    <p:cond delay="0"/>
+                                  </p:stCondLst>
+                                  <p:childTnLst>
+                                    <p:set>
+                                      <p:cBhvr>
+                                        <p:cTn id="14" dur="1" fill="hold">
+                                          <p:stCondLst>
+                                            <p:cond delay="0"/>
+                                          </p:stCondLst>
+                                        </p:cTn>
+                                        <p:tgtEl>
+                                          <p:spTgt spid="10"/>
+                                        </p:tgtEl>
+                                        <p:attrNameLst>
+                                          <p:attrName>style.visibility</p:attrName>
+                                        </p:attrNameLst>
+                                      </p:cBhvr>
+                                      <p:to>
+                                        <p:strVal val="visible"/>
+                                      </p:to>
+                                    </p:set>
+                                  </p:childTnLst>
+                                </p:cTn>
+                              </p:par>
+                            </p:childTnLst>
+                          </p:cTn>
+                        </p:par>
+                      </p:childTnLst>
+                    </p:cTn>
+                  </p:par>
+                  <p:par>
+                    <p:cTn id="15" fill="hold">
+                      <p:stCondLst>
+                        <p:cond delay="indefinite"/>
+                      </p:stCondLst>
+                      <p:childTnLst>
+                        <p:par>
+                          <p:cTn id="16" fill="hold">
+                            <p:stCondLst>
+                              <p:cond delay="0"/>
+                            </p:stCondLst>
+                            <p:childTnLst>
+                              <p:par>
+                                <p:cTn id="17" presetID="1" presetClass="entr" presetSubtype="0" fill="hold" grpId="0" nodeType="clickEffect">
+                                  <p:stCondLst>
+                                    <p:cond delay="0"/>
+                                  </p:stCondLst>
+                                  <p:childTnLst>
+                                    <p:set>
+                                      <p:cBhvr>
+                                        <p:cTn id="18" dur="1" fill="hold">
+                                          <p:stCondLst>
+                                            <p:cond delay="0"/>
+                                          </p:stCondLst>
+                                        </p:cTn>
+                                        <p:tgtEl>
+                                          <p:spTgt spid="11"/>
+                                        </p:tgtEl>
+                                        <p:attrNameLst>
+                                          <p:attrName>style.visibility</p:attrName>
+                                        </p:attrNameLst>
+                                      </p:cBhvr>
+                                      <p:to>
+                                        <p:strVal val="visible"/>
+                                      </p:to>
+                                    </p:set>
+                                  </p:childTnLst>
+                                </p:cTn>
+                              </p:par>
+                            </p:childTnLst>
+                          </p:cTn>
+                        </p:par>
+                      </p:childTnLst>
+                    </p:cTn>
+                  </p:par>
+                  <p:par>
+                    <p:cTn id="19" fill="hold">
+                      <p:stCondLst>
+                        <p:cond delay="indefinite"/>
+                      </p:stCondLst>
+                      <p:childTnLst>
+                        <p:par>
+                          <p:cTn id="20" fill="hold">
+                            <p:stCondLst>
+                              <p:cond delay="0"/>
+                            </p:stCondLst>
+                            <p:childTnLst>
+                              <p:par>
+                                <p:cTn id="21" presetID="1" presetClass="entr" presetSubtype="0" fill="hold" grpId="0" nodeType="clickEffect">
+                                  <p:stCondLst>
+                                    <p:cond delay="0"/>
+                                  </p:stCondLst>
+                                  <p:childTnLst>
+                                    <p:set>
+                                      <p:cBhvr>
+                                        <p:cTn id="22" dur="1" fill="hold">
+                                          <p:stCondLst>
+                                            <p:cond delay="0"/>
+                                          </p:stCondLst>
+                                        </p:cTn>
+                                        <p:tgtEl>
+                                          <p:spTgt spid="12"/>
+                                        </p:tgtEl>
+                                        <p:attrNameLst>
+                                          <p:attrName>style.visibility</p:attrName>
+                                        </p:attrNameLst>
+                                      </p:cBhvr>
+                                      <p:to>
+                                        <p:strVal val="visible"/>
+                                      </p:to>
+                                    </p:set>
+                                  </p:childTnLst>
+                                </p:cTn>
+                              </p:par>
+                            </p:childTnLst>
+                          </p:cTn>
+                        </p:par>
+                      </p:childTnLst>
+                    </p:cTn>
+                  </p:par>
+                  <p:par>
+                    <p:cTn id="23" fill="hold">
+                      <p:stCondLst>
+                        <p:cond delay="indefinite"/>
+                      </p:stCondLst>
+                      <p:childTnLst>
+                        <p:par>
+                          <p:cTn id="24" fill="hold">
+                            <p:stCondLst>
+                              <p:cond delay="0"/>
+                            </p:stCondLst>
+                            <p:childTnLst>
+                              <p:par>
+                                <p:cTn id="25" presetID="1" presetClass="entr" presetSubtype="0" fill="hold" grpId="0" nodeType="clickEffect">
+                                  <p:stCondLst>
+                                    <p:cond delay="0"/>
+                                  </p:stCondLst>
+                                  <p:childTnLst>
+                                    <p:set>
+                                      <p:cBhvr>
+                                        <p:cTn id="26" dur="1" fill="hold">
+                                          <p:stCondLst>
+                                            <p:cond delay="0"/>
+                                          </p:stCondLst>
+                                        </p:cTn>
+                                        <p:tgtEl>
+                                          <p:spTgt spid="14"/>
+                                        </p:tgtEl>
+                                        <p:attrNameLst>
+                                          <p:attrName>style.visibility</p:attrName>
+                                        </p:attrNameLst>
+                                      </p:cBhvr>
+                                      <p:to>
+                                        <p:strVal val="visible"/>
+                                      </p:to>
+                                    </p:set>
+                                  </p:childTnLst>
+                                </p:cTn>
+                              </p:par>
+                            </p:childTnLst>
+                          </p:cTn>
+                        </p:par>
+                      </p:childTnLst>
+                    </p:cTn>
+                  </p:par>
+                  <p:par>
+                    <p:cTn id="27" fill="hold">
+                      <p:stCondLst>
+                        <p:cond delay="indefinite"/>
+                      </p:stCondLst>
+                      <p:childTnLst>
+                        <p:par>
+                          <p:cTn id="28" fill="hold">
+                            <p:stCondLst>
+                              <p:cond delay="0"/>
+                            </p:stCondLst>
+                            <p:childTnLst>
+                              <p:par>
+                                <p:cTn id="29" presetID="1" presetClass="entr" presetSubtype="0" fill="hold" grpId="0" nodeType="clickEffect">
+                                  <p:stCondLst>
+                                    <p:cond delay="0"/>
+                                  </p:stCondLst>
+                                  <p:childTnLst>
+                                    <p:set>
+                                      <p:cBhvr>
+                                        <p:cTn id="30" dur="1" fill="hold">
+                                          <p:stCondLst>
+                                            <p:cond delay="0"/>
+                                          </p:stCondLst>
+                                        </p:cTn>
+                                        <p:tgtEl>
+                                          <p:spTgt spid="15"/>
+                                        </p:tgtEl>
+                                        <p:attrNameLst>
+                                          <p:attrName>style.visibility</p:attrName>
+                                        </p:attrNameLst>
+                                      </p:cBhvr>
+                                      <p:to>
+                                        <p:strVal val="visible"/>
+                                      </p:to>
+                                    </p:set>
+                                  </p:childTnLst>
+                                </p:cTn>
+                              </p:par>
+                            </p:childTnLst>
+                          </p:cTn>
+                        </p:par>
+                      </p:childTnLst>
+                    </p:cTn>
+                  </p:par>
+                  <p:par>
+                    <p:cTn id="31" fill="hold">
+                      <p:stCondLst>
+                        <p:cond delay="indefinite"/>
+                      </p:stCondLst>
+                      <p:childTnLst>
+                        <p:par>
+                          <p:cTn id="32" fill="hold">
+                            <p:stCondLst>
+                              <p:cond delay="0"/>
+                            </p:stCondLst>
+                            <p:childTnLst>
+                              <p:par>
+                                <p:cTn id="33" presetID="1" presetClass="entr" presetSubtype="0" fill="hold" grpId="0" nodeType="clickEffect">
+                                  <p:stCondLst>
+                                    <p:cond delay="0"/>
+                                  </p:stCondLst>
+                                  <p:childTnLst>
+                                    <p:set>
+                                      <p:cBhvr>
+                                        <p:cTn id="34" dur="1" fill="hold">
+                                          <p:stCondLst>
+                                            <p:cond delay="0"/>
+                                          </p:stCondLst>
+                                        </p:cTn>
+                                        <p:tgtEl>
+                                          <p:spTgt spid="6"/>
+                                        </p:tgtEl>
+                                        <p:attrNameLst>
+                                          <p:attrName>style.visibility</p:attrName>
+                                        </p:attrNameLst>
+                                      </p:cBhvr>
+                                      <p:to>
+                                        <p:strVal val="visible"/>
+                                      </p:to>
+                                    </p:set>
+                                  </p:childTnLst>
+                                </p:cTn>
+                              </p:par>
+                            </p:childTnLst>
+                          </p:cTn>
+                        </p:par>
+                      </p:childTnLst>
+                    </p:cTn>
+                  </p:par>
+                </p:childTnLst>
+              </p:cTn>
+              <p:prevCondLst>
+                <p:cond evt="onPrev" delay="0">
+                  <p:tgtEl>
+                    <p:sldTgt/>
+                  </p:tgtEl>
+                </p:cond>
+              </p:prevCondLst>
+              <p:nextCondLst>
+                <p:cond evt="onNext" delay="0">
+                  <p:tgtEl>
+                    <p:sldTgt/>
+                  </p:tgtEl>
+                </p:cond>
+              </p:nextCondLst>
+            </p:seq>
+          </p:childTnLst>
+        </p:cTn>
       </p:par>
     </p:tnLst>
+    <p:bldLst>
+      <p:bldP spid="11" grpId="0" animBg="1"/>
+      <p:bldP spid="10" grpId="0" animBg="1"/>
+      <p:bldP spid="6" grpId="0" animBg="1"/>
+      <p:bldP spid="8" grpId="0" animBg="1"/>
+      <p:bldP spid="9" grpId="0" animBg="1"/>
+      <p:bldP spid="12" grpId="0"/>
+      <p:bldP spid="14" grpId="0"/>
+      <p:bldP spid="15" grpId="0" animBg="1"/>
+    </p:bldLst>
   </p:timing>
 </p:sld>
 </file>

</xml_diff>